<commit_message>
added gsoc blog and changed the first lecture files
</commit_message>
<xml_diff>
--- a/assets/files/blog/tutorials/webdev/Part1.pptx
+++ b/assets/files/blog/tutorials/webdev/Part1.pptx
@@ -227,7 +227,7 @@
           <a:p>
             <a:fld id="{69A25192-EF35-4791-BF15-B954EEFBC80B}" type="datetimeFigureOut">
               <a:rPr lang="en-US" smtClean="0"/>
-              <a:t>6/4/2019</a:t>
+              <a:t>6/5/2019</a:t>
             </a:fld>
             <a:endParaRPr lang="en-US"/>
           </a:p>
@@ -1375,7 +1375,7 @@
           <a:p>
             <a:fld id="{AF7AE3D4-ED82-4D45-B89B-B556869C7473}" type="datetime1">
               <a:rPr lang="en-US" smtClean="0"/>
-              <a:t>6/4/2019</a:t>
+              <a:t>6/5/2019</a:t>
             </a:fld>
             <a:endParaRPr lang="en-US" dirty="0"/>
           </a:p>
@@ -1704,7 +1704,7 @@
           <a:p>
             <a:fld id="{35AA8BF7-5696-457B-A423-CCCC0A67B92B}" type="datetime1">
               <a:rPr lang="en-US" smtClean="0"/>
-              <a:t>6/4/2019</a:t>
+              <a:t>6/5/2019</a:t>
             </a:fld>
             <a:endParaRPr lang="en-US" dirty="0"/>
           </a:p>
@@ -1958,7 +1958,7 @@
           <a:p>
             <a:fld id="{35AA8BF7-5696-457B-A423-CCCC0A67B92B}" type="datetime1">
               <a:rPr lang="en-US" smtClean="0"/>
-              <a:t>6/4/2019</a:t>
+              <a:t>6/5/2019</a:t>
             </a:fld>
             <a:endParaRPr lang="en-US" dirty="0"/>
           </a:p>
@@ -2303,7 +2303,7 @@
           <a:p>
             <a:fld id="{35AA8BF7-5696-457B-A423-CCCC0A67B92B}" type="datetime1">
               <a:rPr lang="en-US" smtClean="0"/>
-              <a:t>6/4/2019</a:t>
+              <a:t>6/5/2019</a:t>
             </a:fld>
             <a:endParaRPr lang="en-US" dirty="0"/>
           </a:p>
@@ -2656,7 +2656,7 @@
           <a:p>
             <a:fld id="{35AA8BF7-5696-457B-A423-CCCC0A67B92B}" type="datetime1">
               <a:rPr lang="en-US" smtClean="0"/>
-              <a:t>6/4/2019</a:t>
+              <a:t>6/5/2019</a:t>
             </a:fld>
             <a:endParaRPr lang="en-US" dirty="0"/>
           </a:p>
@@ -3036,7 +3036,7 @@
           <a:p>
             <a:fld id="{35AA8BF7-5696-457B-A423-CCCC0A67B92B}" type="datetime1">
               <a:rPr lang="en-US" smtClean="0"/>
-              <a:t>6/4/2019</a:t>
+              <a:t>6/5/2019</a:t>
             </a:fld>
             <a:endParaRPr lang="en-US" dirty="0"/>
           </a:p>
@@ -3512,7 +3512,7 @@
           <a:p>
             <a:fld id="{35AA8BF7-5696-457B-A423-CCCC0A67B92B}" type="datetime1">
               <a:rPr lang="en-US" smtClean="0"/>
-              <a:t>6/4/2019</a:t>
+              <a:t>6/5/2019</a:t>
             </a:fld>
             <a:endParaRPr lang="en-US" dirty="0"/>
           </a:p>
@@ -3723,7 +3723,7 @@
           <a:p>
             <a:fld id="{CAAD9D79-B116-4934-B3A7-698A6B4CE0E3}" type="datetime1">
               <a:rPr lang="en-US" smtClean="0"/>
-              <a:t>6/4/2019</a:t>
+              <a:t>6/5/2019</a:t>
             </a:fld>
             <a:endParaRPr lang="en-US" dirty="0"/>
           </a:p>
@@ -3939,7 +3939,7 @@
           <a:p>
             <a:fld id="{EA8468A0-998F-4AC8-BFF4-DA02E84E1498}" type="datetime1">
               <a:rPr lang="en-US" smtClean="0"/>
-              <a:t>6/4/2019</a:t>
+              <a:t>6/5/2019</a:t>
             </a:fld>
             <a:endParaRPr lang="en-US" dirty="0"/>
           </a:p>
@@ -4226,7 +4226,7 @@
           <a:p>
             <a:fld id="{9D5BB369-5639-4A39-996C-AA9D82EABE48}" type="datetime1">
               <a:rPr lang="en-US" smtClean="0"/>
-              <a:t>6/4/2019</a:t>
+              <a:t>6/5/2019</a:t>
             </a:fld>
             <a:endParaRPr lang="en-US" dirty="0"/>
           </a:p>
@@ -4437,7 +4437,7 @@
           <a:p>
             <a:fld id="{A8DFB72C-8242-4682-9D46-C3ACB715404B}" type="datetime1">
               <a:rPr lang="en-US" smtClean="0"/>
-              <a:t>6/4/2019</a:t>
+              <a:t>6/5/2019</a:t>
             </a:fld>
             <a:endParaRPr lang="en-US" dirty="0"/>
           </a:p>
@@ -4690,7 +4690,7 @@
           <a:p>
             <a:fld id="{1A790888-04CB-49C6-9C39-2B378B407BAD}" type="datetime1">
               <a:rPr lang="en-US" smtClean="0"/>
-              <a:t>6/4/2019</a:t>
+              <a:t>6/5/2019</a:t>
             </a:fld>
             <a:endParaRPr lang="en-US" dirty="0"/>
           </a:p>
@@ -4993,7 +4993,7 @@
           <a:p>
             <a:fld id="{6BE5E4D1-DE3C-4345-8EB4-E081F50D2B9B}" type="datetime1">
               <a:rPr lang="en-US" smtClean="0"/>
-              <a:t>6/4/2019</a:t>
+              <a:t>6/5/2019</a:t>
             </a:fld>
             <a:endParaRPr lang="en-US" dirty="0"/>
           </a:p>
@@ -5392,7 +5392,7 @@
           <a:p>
             <a:fld id="{4E5596EA-F5FB-46C2-9465-A43F98A4C0F5}" type="datetime1">
               <a:rPr lang="en-US" smtClean="0"/>
-              <a:t>6/4/2019</a:t>
+              <a:t>6/5/2019</a:t>
             </a:fld>
             <a:endParaRPr lang="en-US" dirty="0"/>
           </a:p>
@@ -5546,7 +5546,7 @@
           <a:p>
             <a:fld id="{04FAAC75-F0AE-4108-951A-C59B6DB55C84}" type="datetime1">
               <a:rPr lang="en-US" smtClean="0"/>
-              <a:t>6/4/2019</a:t>
+              <a:t>6/5/2019</a:t>
             </a:fld>
             <a:endParaRPr lang="en-US" dirty="0"/>
           </a:p>
@@ -5677,7 +5677,7 @@
           <a:p>
             <a:fld id="{0CA2557A-CD1B-4DEA-A425-CA9AB4C09209}" type="datetime1">
               <a:rPr lang="en-US" smtClean="0"/>
-              <a:t>6/4/2019</a:t>
+              <a:t>6/5/2019</a:t>
             </a:fld>
             <a:endParaRPr lang="en-US" dirty="0"/>
           </a:p>
@@ -5937,7 +5937,7 @@
           <a:p>
             <a:fld id="{5116DFD9-9B5F-42CD-B724-BDC59D8878AF}" type="datetime1">
               <a:rPr lang="en-US" smtClean="0"/>
-              <a:t>6/4/2019</a:t>
+              <a:t>6/5/2019</a:t>
             </a:fld>
             <a:endParaRPr lang="en-US" dirty="0"/>
           </a:p>
@@ -6257,7 +6257,7 @@
           <a:p>
             <a:fld id="{7A062630-ECB4-4FC7-A8D5-442D2384D243}" type="datetime1">
               <a:rPr lang="en-US" smtClean="0"/>
-              <a:t>6/4/2019</a:t>
+              <a:t>6/5/2019</a:t>
             </a:fld>
             <a:endParaRPr lang="en-US" dirty="0"/>
           </a:p>
@@ -6613,7 +6613,7 @@
           <a:p>
             <a:fld id="{35AA8BF7-5696-457B-A423-CCCC0A67B92B}" type="datetime1">
               <a:rPr lang="en-US" smtClean="0"/>
-              <a:t>6/4/2019</a:t>
+              <a:t>6/5/2019</a:t>
             </a:fld>
             <a:endParaRPr lang="en-US" dirty="0"/>
           </a:p>
@@ -7224,6 +7224,41 @@
           </a:p>
         </p:txBody>
       </p:sp>
+      <p:sp>
+        <p:nvSpPr>
+          <p:cNvPr id="5" name="TextBox 4">
+            <a:extLst>
+              <a:ext uri="{FF2B5EF4-FFF2-40B4-BE49-F238E27FC236}">
+                <a16:creationId xmlns:a16="http://schemas.microsoft.com/office/drawing/2014/main" id="{914DB5EE-BEBA-4E05-BBB8-7A7167818507}"/>
+              </a:ext>
+            </a:extLst>
+          </p:cNvPr>
+          <p:cNvSpPr txBox="1"/>
+          <p:nvPr/>
+        </p:nvSpPr>
+        <p:spPr>
+          <a:xfrm>
+            <a:off x="7866422" y="5041469"/>
+            <a:ext cx="4734560" cy="338554"/>
+          </a:xfrm>
+          <a:prstGeom prst="rect">
+            <a:avLst/>
+          </a:prstGeom>
+          <a:noFill/>
+        </p:spPr>
+        <p:txBody>
+          <a:bodyPr wrap="square" rtlCol="0" anchor="t">
+            <a:spAutoFit/>
+          </a:bodyPr>
+          <a:lstStyle/>
+          <a:p>
+            <a:r>
+              <a:rPr lang="en-US" sz="1600" dirty="0"/>
+              <a:t>Courtesy – Varun Patil</a:t>
+            </a:r>
+          </a:p>
+        </p:txBody>
+      </p:sp>
     </p:spTree>
     <p:extLst>
       <p:ext uri="{BB962C8B-B14F-4D97-AF65-F5344CB8AC3E}">
@@ -7234,8 +7269,8 @@
   <p:clrMapOvr>
     <a:masterClrMapping/>
   </p:clrMapOvr>
-  <p:transition spd="med">
-    <p:pull/>
+  <p:transition spd="slow">
+    <p:wipe/>
   </p:transition>
 </p:sld>
 </file>
@@ -7377,8 +7412,8 @@
   <p:clrMapOvr>
     <a:masterClrMapping/>
   </p:clrMapOvr>
-  <p:transition spd="med">
-    <p:pull/>
+  <p:transition spd="slow">
+    <p:wipe/>
   </p:transition>
   <p:timing>
     <p:tnLst>
@@ -7783,8 +7818,8 @@
   <p:clrMapOvr>
     <a:masterClrMapping/>
   </p:clrMapOvr>
-  <p:transition spd="med">
-    <p:pull/>
+  <p:transition spd="slow">
+    <p:wipe/>
   </p:transition>
 </p:sld>
 </file>
@@ -7909,8 +7944,8 @@
   <p:clrMapOvr>
     <a:masterClrMapping/>
   </p:clrMapOvr>
-  <p:transition spd="med">
-    <p:pull/>
+  <p:transition spd="slow">
+    <p:wipe/>
   </p:transition>
 </p:sld>
 </file>
@@ -8056,8 +8091,8 @@
   <p:clrMapOvr>
     <a:masterClrMapping/>
   </p:clrMapOvr>
-  <p:transition spd="med">
-    <p:pull/>
+  <p:transition spd="slow">
+    <p:wipe/>
   </p:transition>
 </p:sld>
 </file>
@@ -8274,8 +8309,8 @@
   <p:clrMapOvr>
     <a:masterClrMapping/>
   </p:clrMapOvr>
-  <p:transition spd="med">
-    <p:pull/>
+  <p:transition spd="slow">
+    <p:wipe/>
   </p:transition>
 </p:sld>
 </file>
@@ -8376,8 +8411,8 @@
   <p:clrMapOvr>
     <a:masterClrMapping/>
   </p:clrMapOvr>
-  <p:transition spd="med">
-    <p:pull/>
+  <p:transition spd="slow">
+    <p:wipe/>
   </p:transition>
 </p:sld>
 </file>
@@ -10955,8 +10990,8 @@
   <p:clrMapOvr>
     <a:masterClrMapping/>
   </p:clrMapOvr>
-  <p:transition spd="med">
-    <p:pull/>
+  <p:transition spd="slow">
+    <p:wipe/>
   </p:transition>
   <p:timing>
     <p:tnLst>
@@ -14406,8 +14441,8 @@
   <p:clrMapOvr>
     <a:masterClrMapping/>
   </p:clrMapOvr>
-  <p:transition spd="med">
-    <p:pull/>
+  <p:transition spd="slow">
+    <p:wipe/>
   </p:transition>
 </p:sld>
 </file>
@@ -14564,8 +14599,8 @@
   <p:clrMapOvr>
     <a:masterClrMapping/>
   </p:clrMapOvr>
-  <p:transition spd="med">
-    <p:pull/>
+  <p:transition spd="slow">
+    <p:wipe/>
   </p:transition>
 </p:sld>
 </file>
@@ -14784,8 +14819,8 @@
   <p:clrMapOvr>
     <a:masterClrMapping/>
   </p:clrMapOvr>
-  <p:transition spd="med">
-    <p:pull/>
+  <p:transition spd="slow">
+    <p:wipe/>
   </p:transition>
 </p:sld>
 </file>
@@ -14838,7 +14873,25 @@
                   </a:schemeClr>
                 </a:solidFill>
               </a:rPr>
-              <a:t>Undergraduate, Electrical Engineering</a:t>
+              <a:t>2</a:t>
+            </a:r>
+            <a:r>
+              <a:rPr lang="en-US" sz="3000" baseline="30000" dirty="0">
+                <a:ea typeface="+mj-lt"/>
+                <a:cs typeface="+mj-lt"/>
+              </a:rPr>
+              <a:t>nd</a:t>
+            </a:r>
+            <a:r>
+              <a:rPr lang="en-US" sz="3000" dirty="0">
+                <a:solidFill>
+                  <a:schemeClr val="tx1">
+                    <a:lumMod val="65000"/>
+                    <a:lumOff val="35000"/>
+                  </a:schemeClr>
+                </a:solidFill>
+              </a:rPr>
+              <a:t> Year Undergraduate, Electrical Engineering</a:t>
             </a:r>
           </a:p>
         </p:txBody>
@@ -14903,8 +14956,8 @@
   <p:clrMapOvr>
     <a:masterClrMapping/>
   </p:clrMapOvr>
-  <p:transition spd="med">
-    <p:pull/>
+  <p:transition spd="slow">
+    <p:wipe/>
   </p:transition>
 </p:sld>
 </file>
@@ -15068,8 +15121,8 @@
   <p:clrMapOvr>
     <a:masterClrMapping/>
   </p:clrMapOvr>
-  <p:transition spd="med">
-    <p:pull/>
+  <p:transition spd="slow">
+    <p:wipe/>
   </p:transition>
 </p:sld>
 </file>
@@ -15448,8 +15501,8 @@
   <p:clrMapOvr>
     <a:masterClrMapping/>
   </p:clrMapOvr>
-  <p:transition spd="med">
-    <p:pull/>
+  <p:transition spd="slow">
+    <p:wipe/>
   </p:transition>
 </p:sld>
 </file>
@@ -15758,8 +15811,8 @@
   <p:clrMapOvr>
     <a:masterClrMapping/>
   </p:clrMapOvr>
-  <p:transition spd="med">
-    <p:pull/>
+  <p:transition spd="slow">
+    <p:wipe/>
   </p:transition>
 </p:sld>
 </file>
@@ -15887,8 +15940,8 @@
   <p:clrMapOvr>
     <a:masterClrMapping/>
   </p:clrMapOvr>
-  <p:transition spd="med">
-    <p:pull/>
+  <p:transition spd="slow">
+    <p:wipe/>
   </p:transition>
 </p:sld>
 </file>
@@ -16094,8 +16147,8 @@
   <p:clrMapOvr>
     <a:masterClrMapping/>
   </p:clrMapOvr>
-  <p:transition spd="med">
-    <p:pull/>
+  <p:transition spd="slow">
+    <p:wipe/>
   </p:transition>
 </p:sld>
 </file>
@@ -16275,7 +16328,7 @@
         </p:nvSpPr>
         <p:spPr>
           <a:xfrm>
-            <a:off x="7046912" y="6177280"/>
+            <a:off x="9462309" y="5875356"/>
             <a:ext cx="4734560" cy="338554"/>
           </a:xfrm>
           <a:prstGeom prst="rect">
@@ -16306,8 +16359,8 @@
   <p:clrMapOvr>
     <a:masterClrMapping/>
   </p:clrMapOvr>
-  <p:transition spd="med">
-    <p:pull/>
+  <p:transition spd="slow">
+    <p:wipe/>
   </p:transition>
 </p:sld>
 </file>
@@ -16485,13 +16538,19 @@
       </p:sp>
       <p:sp>
         <p:nvSpPr>
-          <p:cNvPr id="4" name="TextBox 3"/>
+          <p:cNvPr id="5" name="TextBox 4">
+            <a:extLst>
+              <a:ext uri="{FF2B5EF4-FFF2-40B4-BE49-F238E27FC236}">
+                <a16:creationId xmlns:a16="http://schemas.microsoft.com/office/drawing/2014/main" id="{D0A93176-168F-4ADC-B637-E1E6293EFFCE}"/>
+              </a:ext>
+            </a:extLst>
+          </p:cNvPr>
           <p:cNvSpPr txBox="1"/>
           <p:nvPr/>
         </p:nvSpPr>
         <p:spPr>
           <a:xfrm>
-            <a:off x="7046912" y="6177280"/>
+            <a:off x="9462309" y="5875356"/>
             <a:ext cx="4734560" cy="338554"/>
           </a:xfrm>
           <a:prstGeom prst="rect">
@@ -16522,8 +16581,8 @@
   <p:clrMapOvr>
     <a:masterClrMapping/>
   </p:clrMapOvr>
-  <p:transition spd="med">
-    <p:pull/>
+  <p:transition spd="slow">
+    <p:wipe/>
   </p:transition>
 </p:sld>
 </file>
@@ -16848,8 +16907,8 @@
   <p:clrMapOvr>
     <a:masterClrMapping/>
   </p:clrMapOvr>
-  <p:transition spd="med">
-    <p:pull/>
+  <p:transition spd="slow">
+    <p:wipe/>
   </p:transition>
 </p:sld>
 </file>
@@ -17500,8 +17559,8 @@
   <p:clrMapOvr>
     <a:masterClrMapping/>
   </p:clrMapOvr>
-  <p:transition spd="med">
-    <p:pull/>
+  <p:transition spd="slow">
+    <p:wipe/>
   </p:transition>
 </p:sld>
 </file>
@@ -17916,8 +17975,8 @@
   <p:clrMapOvr>
     <a:masterClrMapping/>
   </p:clrMapOvr>
-  <p:transition spd="med">
-    <p:pull/>
+  <p:transition spd="slow">
+    <p:wipe/>
   </p:transition>
 </p:sld>
 </file>
@@ -18059,8 +18118,8 @@
   <p:clrMapOvr>
     <a:masterClrMapping/>
   </p:clrMapOvr>
-  <p:transition spd="med">
-    <p:pull/>
+  <p:transition spd="slow">
+    <p:wipe/>
   </p:transition>
 </p:sld>
 </file>
@@ -18492,8 +18551,8 @@
   <p:clrMapOvr>
     <a:masterClrMapping/>
   </p:clrMapOvr>
-  <p:transition spd="med">
-    <p:pull/>
+  <p:transition spd="slow">
+    <p:wipe/>
   </p:transition>
 </p:sld>
 </file>
@@ -18566,8 +18625,8 @@
   <p:clrMapOvr>
     <a:masterClrMapping/>
   </p:clrMapOvr>
-  <p:transition spd="med">
-    <p:pull/>
+  <p:transition spd="slow">
+    <p:wipe/>
   </p:transition>
 </p:sld>
 </file>
@@ -18606,18 +18665,17 @@
           <a:p>
             <a:r>
               <a:rPr lang="en-US" dirty="0">
-                <a:cs typeface="Segoe UI" panose="020B0502040204020203" pitchFamily="34" charset="0"/>
-              </a:rPr>
-              <a:t>What is the Web</a:t>
+                <a:cs typeface="Segoe UI"/>
+              </a:rPr>
+              <a:t>What is the World Wide Web</a:t>
             </a:r>
             <a:r>
               <a:rPr lang="en-US" dirty="0">
-                <a:latin typeface="Segoe UI" panose="020B0502040204020203" pitchFamily="34" charset="0"/>
-                <a:cs typeface="Segoe UI" panose="020B0502040204020203" pitchFamily="34" charset="0"/>
+                <a:latin typeface="Segoe UI"/>
+                <a:cs typeface="Segoe UI"/>
               </a:rPr>
               <a:t>?</a:t>
             </a:r>
-            <a:endParaRPr lang="en-US" dirty="0"/>
           </a:p>
         </p:txBody>
       </p:sp>
@@ -18740,8 +18798,8 @@
   <p:clrMapOvr>
     <a:masterClrMapping/>
   </p:clrMapOvr>
-  <p:transition spd="med">
-    <p:pull/>
+  <p:transition spd="slow">
+    <p:wipe/>
   </p:transition>
   <p:timing>
     <p:tnLst>
@@ -19192,8 +19250,8 @@
   <p:clrMapOvr>
     <a:masterClrMapping/>
   </p:clrMapOvr>
-  <p:transition spd="med">
-    <p:pull/>
+  <p:transition spd="slow">
+    <p:wipe/>
   </p:transition>
   <p:timing>
     <p:tnLst>
@@ -19526,7 +19584,7 @@
         </p:nvSpPr>
         <p:spPr>
           <a:xfrm>
-            <a:off x="6944810" y="6007938"/>
+            <a:off x="6786659" y="5849787"/>
             <a:ext cx="4849793" cy="369332"/>
           </a:xfrm>
           <a:prstGeom prst="rect">
@@ -19561,8 +19619,8 @@
   <p:clrMapOvr>
     <a:masterClrMapping/>
   </p:clrMapOvr>
-  <p:transition spd="med">
-    <p:pull/>
+  <p:transition spd="slow">
+    <p:wipe/>
   </p:transition>
 </p:sld>
 </file>
@@ -19692,8 +19750,8 @@
   <p:clrMapOvr>
     <a:masterClrMapping/>
   </p:clrMapOvr>
-  <p:transition spd="med">
-    <p:pull/>
+  <p:transition spd="slow">
+    <p:wipe/>
   </p:transition>
   <p:timing>
     <p:tnLst>
@@ -20039,8 +20097,8 @@
   <p:clrMapOvr>
     <a:masterClrMapping/>
   </p:clrMapOvr>
-  <p:transition spd="med">
-    <p:pull/>
+  <p:transition spd="slow">
+    <p:wipe/>
   </p:transition>
 </p:sld>
 </file>
@@ -20303,8 +20361,8 @@
   <p:clrMapOvr>
     <a:masterClrMapping/>
   </p:clrMapOvr>
-  <p:transition spd="med">
-    <p:pull/>
+  <p:transition spd="slow">
+    <p:wipe/>
   </p:transition>
   <p:timing>
     <p:tnLst>

</xml_diff>